<commit_message>
update presentation and export data to csv
</commit_message>
<xml_diff>
--- a/Reports & Presentations/Luxembourg_Development_EDA_Presentation.pptx
+++ b/Reports & Presentations/Luxembourg_Development_EDA_Presentation.pptx
@@ -2102,7 +2102,7 @@
                 <a:ea typeface="Arial" pitchFamily="34" charset="-122"/>
                 <a:cs typeface="Arial" pitchFamily="34" charset="-120"/>
               </a:rPr>
-              <a:t>Strategic positioning enables sustained prosperity despite global exposure</a:t>
+              <a:t>Strategic positioning enables sustained prosperity despite small country size</a:t>
             </a:r>
             <a:endParaRPr lang="en-US" sz="1350" dirty="0"/>
           </a:p>
@@ -2809,7 +2809,7 @@
                 <a:ea typeface="Arial" pitchFamily="34" charset="-122"/>
                 <a:cs typeface="Arial" pitchFamily="34" charset="-120"/>
               </a:rPr>
-              <a:t>Univariate, bivariate, correlation analysis</a:t>
+              <a:t>Univariate, bivariate, multivariate and correlation analysis</a:t>
             </a:r>
             <a:endParaRPr lang="en-US" sz="1200" dirty="0"/>
           </a:p>
@@ -2967,7 +2967,7 @@
                 <a:ea typeface="Arial" pitchFamily="34" charset="-122"/>
                 <a:cs typeface="Arial" pitchFamily="34" charset="-120"/>
               </a:rPr>
-              <a:t>Pattern identification, policy implications</a:t>
+              <a:t>Pattern identification and </a:t>
             </a:r>
             <a:endParaRPr lang="en-US" sz="1200" dirty="0"/>
           </a:p>
@@ -3432,7 +3432,7 @@
                 <a:ea typeface="Arial" pitchFamily="34" charset="-122"/>
                 <a:cs typeface="Arial" pitchFamily="34" charset="-120"/>
               </a:rPr>
-              <a:t>What's the link between prosperity and health outcomes?</a:t>
+              <a:t>What's the link between GDP and health outcomes?</a:t>
             </a:r>
             <a:endParaRPr lang="en-US" sz="1500" dirty="0"/>
           </a:p>
@@ -4319,7 +4319,7 @@
                 <a:ea typeface="Arial" pitchFamily="34" charset="-122"/>
                 <a:cs typeface="Arial" pitchFamily="34" charset="-120"/>
               </a:rPr>
-              <a:t>Negative correlation with temporal variation (2004-2024)</a:t>
+              <a:t>Negative correlation (-0.43 Spearman Correlation) (2004-2024)</a:t>
             </a:r>
             <a:endParaRPr lang="en-US" sz="1200" dirty="0"/>
           </a:p>
@@ -4466,7 +4466,7 @@
                 <a:ea typeface="Arial" pitchFamily="34" charset="-122"/>
                 <a:cs typeface="Arial" pitchFamily="34" charset="-120"/>
               </a:rPr>
-              <a:t>Strong positive correlation: r = 0.95 (1994-2024)</a:t>
+              <a:t>Strong positive correlation (0.95 Pearson Correlation) (1994-2024)</a:t>
             </a:r>
             <a:endParaRPr lang="en-US" sz="1200" dirty="0"/>
           </a:p>
@@ -4613,7 +4613,7 @@
                 <a:ea typeface="Arial" pitchFamily="34" charset="-122"/>
                 <a:cs typeface="Arial" pitchFamily="34" charset="-120"/>
               </a:rPr>
-              <a:t>Counterintuitive negative relationship (after controlling for population)</a:t>
+              <a:t>Counterintuitive negative relationship (after removing the population trend)</a:t>
             </a:r>
             <a:endParaRPr lang="en-US" sz="1200" dirty="0"/>
           </a:p>

</xml_diff>